<commit_message>
Updated Lecture 4 Examples
</commit_message>
<xml_diff>
--- a/04-Conditions.pptx
+++ b/04-Conditions.pptx
@@ -17,9 +17,8 @@
     <p:sldId id="305" r:id="rId11"/>
     <p:sldId id="306" r:id="rId12"/>
     <p:sldId id="295" r:id="rId13"/>
-    <p:sldId id="320" r:id="rId14"/>
-    <p:sldId id="268" r:id="rId15"/>
-    <p:sldId id="269" r:id="rId16"/>
+    <p:sldId id="268" r:id="rId14"/>
+    <p:sldId id="269" r:id="rId15"/>
   </p:sldIdLst>
   <p:sldSz cx="9144000" cy="6858000" type="screen4x3"/>
   <p:notesSz cx="6858000" cy="9144000"/>
@@ -318,7 +317,7 @@
           <a:p>
             <a:fld id="{3EA744D9-3FBE-48D8-BF2A-85DF203E4D20}" type="datetimeFigureOut">
               <a:rPr lang="bg-BG" smtClean="0"/>
-              <a:t>23.10.2015 г.</a:t>
+              <a:t>29.10.2015 г.</a:t>
             </a:fld>
             <a:endParaRPr lang="bg-BG"/>
           </a:p>
@@ -488,7 +487,7 @@
           <a:p>
             <a:fld id="{3EA744D9-3FBE-48D8-BF2A-85DF203E4D20}" type="datetimeFigureOut">
               <a:rPr lang="bg-BG" smtClean="0"/>
-              <a:t>23.10.2015 г.</a:t>
+              <a:t>29.10.2015 г.</a:t>
             </a:fld>
             <a:endParaRPr lang="bg-BG"/>
           </a:p>
@@ -668,7 +667,7 @@
           <a:p>
             <a:fld id="{3EA744D9-3FBE-48D8-BF2A-85DF203E4D20}" type="datetimeFigureOut">
               <a:rPr lang="bg-BG" smtClean="0"/>
-              <a:t>23.10.2015 г.</a:t>
+              <a:t>29.10.2015 г.</a:t>
             </a:fld>
             <a:endParaRPr lang="bg-BG"/>
           </a:p>
@@ -838,7 +837,7 @@
           <a:p>
             <a:fld id="{3EA744D9-3FBE-48D8-BF2A-85DF203E4D20}" type="datetimeFigureOut">
               <a:rPr lang="bg-BG" smtClean="0"/>
-              <a:t>23.10.2015 г.</a:t>
+              <a:t>29.10.2015 г.</a:t>
             </a:fld>
             <a:endParaRPr lang="bg-BG"/>
           </a:p>
@@ -1084,7 +1083,7 @@
           <a:p>
             <a:fld id="{3EA744D9-3FBE-48D8-BF2A-85DF203E4D20}" type="datetimeFigureOut">
               <a:rPr lang="bg-BG" smtClean="0"/>
-              <a:t>23.10.2015 г.</a:t>
+              <a:t>29.10.2015 г.</a:t>
             </a:fld>
             <a:endParaRPr lang="bg-BG"/>
           </a:p>
@@ -1372,7 +1371,7 @@
           <a:p>
             <a:fld id="{3EA744D9-3FBE-48D8-BF2A-85DF203E4D20}" type="datetimeFigureOut">
               <a:rPr lang="bg-BG" smtClean="0"/>
-              <a:t>23.10.2015 г.</a:t>
+              <a:t>29.10.2015 г.</a:t>
             </a:fld>
             <a:endParaRPr lang="bg-BG"/>
           </a:p>
@@ -1794,7 +1793,7 @@
           <a:p>
             <a:fld id="{3EA744D9-3FBE-48D8-BF2A-85DF203E4D20}" type="datetimeFigureOut">
               <a:rPr lang="bg-BG" smtClean="0"/>
-              <a:t>23.10.2015 г.</a:t>
+              <a:t>29.10.2015 г.</a:t>
             </a:fld>
             <a:endParaRPr lang="bg-BG"/>
           </a:p>
@@ -1912,7 +1911,7 @@
           <a:p>
             <a:fld id="{3EA744D9-3FBE-48D8-BF2A-85DF203E4D20}" type="datetimeFigureOut">
               <a:rPr lang="bg-BG" smtClean="0"/>
-              <a:t>23.10.2015 г.</a:t>
+              <a:t>29.10.2015 г.</a:t>
             </a:fld>
             <a:endParaRPr lang="bg-BG"/>
           </a:p>
@@ -2007,7 +2006,7 @@
           <a:p>
             <a:fld id="{3EA744D9-3FBE-48D8-BF2A-85DF203E4D20}" type="datetimeFigureOut">
               <a:rPr lang="bg-BG" smtClean="0"/>
-              <a:t>23.10.2015 г.</a:t>
+              <a:t>29.10.2015 г.</a:t>
             </a:fld>
             <a:endParaRPr lang="bg-BG"/>
           </a:p>
@@ -2284,7 +2283,7 @@
           <a:p>
             <a:fld id="{3EA744D9-3FBE-48D8-BF2A-85DF203E4D20}" type="datetimeFigureOut">
               <a:rPr lang="bg-BG" smtClean="0"/>
-              <a:t>23.10.2015 г.</a:t>
+              <a:t>29.10.2015 г.</a:t>
             </a:fld>
             <a:endParaRPr lang="bg-BG"/>
           </a:p>
@@ -2537,7 +2536,7 @@
           <a:p>
             <a:fld id="{3EA744D9-3FBE-48D8-BF2A-85DF203E4D20}" type="datetimeFigureOut">
               <a:rPr lang="bg-BG" smtClean="0"/>
-              <a:t>23.10.2015 г.</a:t>
+              <a:t>29.10.2015 г.</a:t>
             </a:fld>
             <a:endParaRPr lang="bg-BG"/>
           </a:p>
@@ -2759,7 +2758,7 @@
           <a:p>
             <a:fld id="{3EA744D9-3FBE-48D8-BF2A-85DF203E4D20}" type="datetimeFigureOut">
               <a:rPr lang="bg-BG" smtClean="0"/>
-              <a:t>23.10.2015 г.</a:t>
+              <a:t>29.10.2015 г.</a:t>
             </a:fld>
             <a:endParaRPr lang="bg-BG"/>
           </a:p>
@@ -3323,25 +3322,8 @@
                   </a:schemeClr>
                 </a:solidFill>
               </a:rPr>
-              <a:t>) </a:t>
-            </a:r>
-            <a:r>
-              <a:rPr lang="en-US" dirty="0" smtClean="0">
-                <a:solidFill>
-                  <a:schemeClr val="bg1">
-                    <a:lumMod val="95000"/>
-                  </a:schemeClr>
-                </a:solidFill>
-              </a:rPr>
-              <a:t>{</a:t>
-            </a:r>
-            <a:endParaRPr lang="en-US" dirty="0" smtClean="0">
-              <a:solidFill>
-                <a:schemeClr val="bg1">
-                  <a:lumMod val="95000"/>
-                </a:schemeClr>
-              </a:solidFill>
-            </a:endParaRPr>
+              <a:t>) {</a:t>
+            </a:r>
           </a:p>
           <a:p>
             <a:pPr marL="0" indent="0">
@@ -3775,17 +3757,7 @@
                   </a:schemeClr>
                 </a:solidFill>
               </a:rPr>
-              <a:t>) </a:t>
-            </a:r>
-            <a:r>
-              <a:rPr lang="en-US" dirty="0" smtClean="0">
-                <a:solidFill>
-                  <a:schemeClr val="bg1">
-                    <a:lumMod val="95000"/>
-                  </a:schemeClr>
-                </a:solidFill>
-              </a:rPr>
-              <a:t>{</a:t>
+              <a:t>) {</a:t>
             </a:r>
           </a:p>
           <a:p>
@@ -4262,106 +4234,6 @@
             <p:ph type="title"/>
           </p:nvPr>
         </p:nvSpPr>
-        <p:spPr/>
-        <p:txBody>
-          <a:bodyPr>
-            <a:normAutofit/>
-          </a:bodyPr>
-          <a:lstStyle/>
-          <a:p>
-            <a:r>
-              <a:rPr lang="bg-BG" dirty="0" smtClean="0">
-                <a:solidFill>
-                  <a:schemeClr val="accent6"/>
-                </a:solidFill>
-              </a:rPr>
-              <a:t>Задача</a:t>
-            </a:r>
-            <a:endParaRPr lang="en-US" dirty="0"/>
-          </a:p>
-        </p:txBody>
-      </p:sp>
-      <p:sp>
-        <p:nvSpPr>
-          <p:cNvPr id="3" name="Content Placeholder 2"/>
-          <p:cNvSpPr>
-            <a:spLocks noGrp="1"/>
-          </p:cNvSpPr>
-          <p:nvPr>
-            <p:ph idx="1"/>
-          </p:nvPr>
-        </p:nvSpPr>
-        <p:spPr/>
-        <p:txBody>
-          <a:bodyPr/>
-          <a:lstStyle/>
-          <a:p>
-            <a:r>
-              <a:rPr lang="ru-RU" dirty="0">
-                <a:solidFill>
-                  <a:schemeClr val="bg1"/>
-                </a:solidFill>
-              </a:rPr>
-              <a:t>Напишете програма, която по избор на потребителя прочита от конзолата променлива от тип int, double или string. Ако променливата е int или double, трябва да се увеличи с 1. Ако променливата е string, трябва да се прибави накрая символа "*". Отпечатайте получения резултат на конзолата. </a:t>
-            </a:r>
-            <a:endParaRPr lang="en-US" dirty="0">
-              <a:solidFill>
-                <a:schemeClr val="bg1"/>
-              </a:solidFill>
-            </a:endParaRPr>
-          </a:p>
-          <a:p>
-            <a:endParaRPr lang="en-US" dirty="0"/>
-          </a:p>
-        </p:txBody>
-      </p:sp>
-    </p:spTree>
-    <p:extLst>
-      <p:ext uri="{BB962C8B-B14F-4D97-AF65-F5344CB8AC3E}">
-        <p14:creationId xmlns:p14="http://schemas.microsoft.com/office/powerpoint/2010/main" val="651094813"/>
-      </p:ext>
-    </p:extLst>
-  </p:cSld>
-  <p:clrMapOvr>
-    <a:masterClrMapping/>
-  </p:clrMapOvr>
-  <p:timing>
-    <p:tnLst>
-      <p:par>
-        <p:cTn id="1" dur="indefinite" restart="never" nodeType="tmRoot"/>
-      </p:par>
-    </p:tnLst>
-  </p:timing>
-</p:sld>
-</file>
-
-<file path=ppt/slides/slide14.xml><?xml version="1.0" encoding="utf-8"?>
-<p:sld xmlns:a="http://schemas.openxmlformats.org/drawingml/2006/main" xmlns:r="http://schemas.openxmlformats.org/officeDocument/2006/relationships" xmlns:p="http://schemas.openxmlformats.org/presentationml/2006/main">
-  <p:cSld>
-    <p:spTree>
-      <p:nvGrpSpPr>
-        <p:cNvPr id="1" name=""/>
-        <p:cNvGrpSpPr/>
-        <p:nvPr/>
-      </p:nvGrpSpPr>
-      <p:grpSpPr>
-        <a:xfrm>
-          <a:off x="0" y="0"/>
-          <a:ext cx="0" cy="0"/>
-          <a:chOff x="0" y="0"/>
-          <a:chExt cx="0" cy="0"/>
-        </a:xfrm>
-      </p:grpSpPr>
-      <p:sp>
-        <p:nvSpPr>
-          <p:cNvPr id="2" name="Title 1"/>
-          <p:cNvSpPr>
-            <a:spLocks noGrp="1"/>
-          </p:cNvSpPr>
-          <p:nvPr>
-            <p:ph type="title"/>
-          </p:nvPr>
-        </p:nvSpPr>
         <p:spPr>
           <a:xfrm>
             <a:off x="838200" y="685800"/>
@@ -4525,7 +4397,7 @@
 </p:sld>
 </file>
 
-<file path=ppt/slides/slide15.xml><?xml version="1.0" encoding="utf-8"?>
+<file path=ppt/slides/slide14.xml><?xml version="1.0" encoding="utf-8"?>
 <p:sld xmlns:a="http://schemas.openxmlformats.org/drawingml/2006/main" xmlns:r="http://schemas.openxmlformats.org/officeDocument/2006/relationships" xmlns:p="http://schemas.openxmlformats.org/presentationml/2006/main">
   <p:cSld>
     <p:spTree>
@@ -6446,25 +6318,8 @@
                   </a:schemeClr>
                 </a:solidFill>
               </a:rPr>
-              <a:t> </a:t>
-            </a:r>
-            <a:r>
-              <a:rPr lang="en-US" dirty="0" smtClean="0">
-                <a:solidFill>
-                  <a:schemeClr val="bg1">
-                    <a:lumMod val="95000"/>
-                  </a:schemeClr>
-                </a:solidFill>
-              </a:rPr>
-              <a:t>{</a:t>
-            </a:r>
-            <a:endParaRPr lang="en-US" dirty="0" smtClean="0">
-              <a:solidFill>
-                <a:schemeClr val="bg1">
-                  <a:lumMod val="95000"/>
-                </a:schemeClr>
-              </a:solidFill>
-            </a:endParaRPr>
+              <a:t> {</a:t>
+            </a:r>
           </a:p>
           <a:p>
             <a:pPr marL="0" indent="0">
@@ -6708,8 +6563,13 @@
                   </a:schemeClr>
                 </a:solidFill>
               </a:rPr>
-              <a:t> </a:t>
-            </a:r>
+              <a:t> {</a:t>
+            </a:r>
+          </a:p>
+          <a:p>
+            <a:pPr marL="0" indent="0">
+              <a:buNone/>
+            </a:pPr>
             <a:r>
               <a:rPr lang="en-US" dirty="0" smtClean="0">
                 <a:solidFill>
@@ -6718,7 +6578,17 @@
                   </a:schemeClr>
                 </a:solidFill>
               </a:rPr>
-              <a:t>{</a:t>
+              <a:t>	</a:t>
+            </a:r>
+            <a:r>
+              <a:rPr lang="bg-BG" dirty="0" smtClean="0">
+                <a:solidFill>
+                  <a:schemeClr val="bg1">
+                    <a:lumMod val="95000"/>
+                  </a:schemeClr>
+                </a:solidFill>
+              </a:rPr>
+              <a:t>тяло на условната конструкция</a:t>
             </a:r>
             <a:endParaRPr lang="en-US" dirty="0" smtClean="0">
               <a:solidFill>
@@ -6740,59 +6610,7 @@
                   </a:schemeClr>
                 </a:solidFill>
               </a:rPr>
-              <a:t>	</a:t>
-            </a:r>
-            <a:r>
-              <a:rPr lang="bg-BG" dirty="0" smtClean="0">
-                <a:solidFill>
-                  <a:schemeClr val="bg1">
-                    <a:lumMod val="95000"/>
-                  </a:schemeClr>
-                </a:solidFill>
-              </a:rPr>
-              <a:t>тяло на условната конструкция</a:t>
-            </a:r>
-            <a:endParaRPr lang="en-US" dirty="0" smtClean="0">
-              <a:solidFill>
-                <a:schemeClr val="bg1">
-                  <a:lumMod val="95000"/>
-                </a:schemeClr>
-              </a:solidFill>
-            </a:endParaRPr>
-          </a:p>
-          <a:p>
-            <a:pPr marL="0" indent="0">
-              <a:buNone/>
-            </a:pPr>
-            <a:r>
-              <a:rPr lang="en-US" dirty="0" smtClean="0">
-                <a:solidFill>
-                  <a:schemeClr val="bg1">
-                    <a:lumMod val="95000"/>
-                  </a:schemeClr>
-                </a:solidFill>
-              </a:rPr>
-              <a:t>} </a:t>
-            </a:r>
-            <a:r>
-              <a:rPr lang="en-US" dirty="0" smtClean="0">
-                <a:solidFill>
-                  <a:schemeClr val="bg1">
-                    <a:lumMod val="95000"/>
-                  </a:schemeClr>
-                </a:solidFill>
-              </a:rPr>
-              <a:t>else </a:t>
-            </a:r>
-            <a:r>
-              <a:rPr lang="en-US" dirty="0" smtClean="0">
-                <a:solidFill>
-                  <a:schemeClr val="bg1">
-                    <a:lumMod val="95000"/>
-                  </a:schemeClr>
-                </a:solidFill>
-              </a:rPr>
-              <a:t>{</a:t>
+              <a:t>} else {</a:t>
             </a:r>
           </a:p>
           <a:p>
@@ -7038,8 +6856,13 @@
                   </a:schemeClr>
                 </a:solidFill>
               </a:rPr>
-              <a:t> </a:t>
-            </a:r>
+              <a:t> {</a:t>
+            </a:r>
+          </a:p>
+          <a:p>
+            <a:pPr marL="0" indent="0">
+              <a:buNone/>
+            </a:pPr>
             <a:r>
               <a:rPr lang="en-US" dirty="0" smtClean="0">
                 <a:solidFill>
@@ -7048,7 +6871,17 @@
                   </a:schemeClr>
                 </a:solidFill>
               </a:rPr>
-              <a:t>{</a:t>
+              <a:t>	</a:t>
+            </a:r>
+            <a:r>
+              <a:rPr lang="bg-BG" dirty="0" smtClean="0">
+                <a:solidFill>
+                  <a:schemeClr val="bg1">
+                    <a:lumMod val="95000"/>
+                  </a:schemeClr>
+                </a:solidFill>
+              </a:rPr>
+              <a:t>тяло на условната конструкция</a:t>
             </a:r>
             <a:endParaRPr lang="en-US" dirty="0" smtClean="0">
               <a:solidFill>
@@ -7070,59 +6903,7 @@
                   </a:schemeClr>
                 </a:solidFill>
               </a:rPr>
-              <a:t>	</a:t>
-            </a:r>
-            <a:r>
-              <a:rPr lang="bg-BG" dirty="0" smtClean="0">
-                <a:solidFill>
-                  <a:schemeClr val="bg1">
-                    <a:lumMod val="95000"/>
-                  </a:schemeClr>
-                </a:solidFill>
-              </a:rPr>
-              <a:t>тяло на условната конструкция</a:t>
-            </a:r>
-            <a:endParaRPr lang="en-US" dirty="0" smtClean="0">
-              <a:solidFill>
-                <a:schemeClr val="bg1">
-                  <a:lumMod val="95000"/>
-                </a:schemeClr>
-              </a:solidFill>
-            </a:endParaRPr>
-          </a:p>
-          <a:p>
-            <a:pPr marL="0" indent="0">
-              <a:buNone/>
-            </a:pPr>
-            <a:r>
-              <a:rPr lang="en-US" dirty="0" smtClean="0">
-                <a:solidFill>
-                  <a:schemeClr val="bg1">
-                    <a:lumMod val="95000"/>
-                  </a:schemeClr>
-                </a:solidFill>
-              </a:rPr>
-              <a:t>} </a:t>
-            </a:r>
-            <a:r>
-              <a:rPr lang="en-US" dirty="0" smtClean="0">
-                <a:solidFill>
-                  <a:schemeClr val="bg1">
-                    <a:lumMod val="95000"/>
-                  </a:schemeClr>
-                </a:solidFill>
-              </a:rPr>
-              <a:t>else </a:t>
-            </a:r>
-            <a:r>
-              <a:rPr lang="en-US" dirty="0" smtClean="0">
-                <a:solidFill>
-                  <a:schemeClr val="bg1">
-                    <a:lumMod val="95000"/>
-                  </a:schemeClr>
-                </a:solidFill>
-              </a:rPr>
-              <a:t>if (</a:t>
+              <a:t>} else if (</a:t>
             </a:r>
             <a:r>
               <a:rPr lang="bg-BG" dirty="0" smtClean="0">
@@ -7258,13 +7039,6 @@
               </a:rPr>
               <a:t>else {</a:t>
             </a:r>
-            <a:endParaRPr lang="en-US" dirty="0" smtClean="0">
-              <a:solidFill>
-                <a:schemeClr val="bg1">
-                  <a:lumMod val="95000"/>
-                </a:schemeClr>
-              </a:solidFill>
-            </a:endParaRPr>
           </a:p>
           <a:p>
             <a:pPr marL="0" indent="0">
@@ -7477,25 +7251,8 @@
                   </a:schemeClr>
                 </a:solidFill>
               </a:rPr>
-              <a:t> </a:t>
-            </a:r>
-            <a:r>
-              <a:rPr lang="en-US" dirty="0" smtClean="0">
-                <a:solidFill>
-                  <a:schemeClr val="bg1">
-                    <a:lumMod val="95000"/>
-                  </a:schemeClr>
-                </a:solidFill>
-              </a:rPr>
-              <a:t>{</a:t>
-            </a:r>
-            <a:endParaRPr lang="en-US" dirty="0" smtClean="0">
-              <a:solidFill>
-                <a:schemeClr val="bg1">
-                  <a:lumMod val="95000"/>
-                </a:schemeClr>
-              </a:solidFill>
-            </a:endParaRPr>
+              <a:t> {</a:t>
+            </a:r>
           </a:p>
           <a:p>
             <a:pPr marL="0" indent="0">

</xml_diff>